<commit_message>
Data Operation using SQLCommand
</commit_message>
<xml_diff>
--- a/PPTs/ASP.Net WebForms - States Management.pptx
+++ b/PPTs/ASP.Net WebForms - States Management.pptx
@@ -4735,11 +4735,7 @@
           <a:p>
             <a:r>
               <a:rPr lang="en-US" dirty="0" smtClean="0"/>
-              <a:t>Clint Side State </a:t>
-            </a:r>
-            <a:r>
-              <a:rPr lang="en-US" smtClean="0"/>
-              <a:t>vs Server Side State</a:t>
+              <a:t>Clint Side State vs Server Side State</a:t>
             </a:r>
             <a:endParaRPr lang="en-US" dirty="0" smtClean="0"/>
           </a:p>
@@ -5349,8 +5345,8 @@
           <a:lstStyle/>
           <a:p>
             <a:r>
-              <a:rPr lang="en-US" sz="2800" dirty="0" err="1" smtClean="0"/>
-              <a:t>System.Exceptions</a:t>
+              <a:rPr lang="en-US" sz="2800" dirty="0" smtClean="0"/>
+              <a:t>Application State</a:t>
             </a:r>
             <a:endParaRPr lang="en-US" sz="2800" dirty="0"/>
           </a:p>
@@ -5365,7 +5361,7 @@
         <p:spPr>
           <a:xfrm>
             <a:off x="3794974" y="1123837"/>
-            <a:ext cx="7229342" cy="911019"/>
+            <a:ext cx="7229342" cy="1994392"/>
           </a:xfrm>
           <a:prstGeom prst="rect">
             <a:avLst/>
@@ -5377,7 +5373,7 @@
           </a:bodyPr>
           <a:lstStyle/>
           <a:p>
-            <a:pPr defTabSz="914400">
+            <a:pPr marL="457200" indent="-457200" defTabSz="914400">
               <a:lnSpc>
                 <a:spcPct val="90000"/>
               </a:lnSpc>
@@ -5387,6 +5383,35 @@
               <a:buClr>
                 <a:schemeClr val="accent1"/>
               </a:buClr>
+              <a:buFont typeface="Arial" panose="020B0604020202020204" pitchFamily="34" charset="0"/>
+              <a:buChar char="•"/>
+            </a:pPr>
+            <a:r>
+              <a:rPr lang="en-US" sz="2800" dirty="0" smtClean="0"/>
+              <a:t>Available </a:t>
+            </a:r>
+            <a:r>
+              <a:rPr lang="en-US" sz="2800" dirty="0"/>
+              <a:t>across all pages and all </a:t>
+            </a:r>
+            <a:r>
+              <a:rPr lang="en-US" sz="2800" dirty="0" smtClean="0"/>
+              <a:t>sessions</a:t>
+            </a:r>
+          </a:p>
+          <a:p>
+            <a:pPr marL="457200" indent="-457200" defTabSz="914400">
+              <a:lnSpc>
+                <a:spcPct val="90000"/>
+              </a:lnSpc>
+              <a:spcBef>
+                <a:spcPts val="1200"/>
+              </a:spcBef>
+              <a:buClr>
+                <a:schemeClr val="accent1"/>
+              </a:buClr>
+              <a:buFont typeface="Arial" panose="020B0604020202020204" pitchFamily="34" charset="0"/>
+              <a:buChar char="•"/>
             </a:pPr>
             <a:r>
               <a:rPr lang="en-US" sz="2800" dirty="0" smtClean="0">
@@ -5397,10 +5422,10 @@
                   </a:schemeClr>
                 </a:solidFill>
               </a:rPr>
-              <a:t>Important Members of </a:t>
-            </a:r>
-            <a:r>
-              <a:rPr lang="en-US" sz="2800" dirty="0" err="1" smtClean="0">
+              <a:t>Stored on a </a:t>
+            </a:r>
+            <a:r>
+              <a:rPr lang="en-US" sz="2800" smtClean="0">
                 <a:solidFill>
                   <a:schemeClr val="tx1">
                     <a:lumMod val="65000"/>
@@ -5408,8 +5433,23 @@
                   </a:schemeClr>
                 </a:solidFill>
               </a:rPr>
-              <a:t>System.Exceptions</a:t>
-            </a:r>
+              <a:t>Web Server</a:t>
+            </a:r>
+          </a:p>
+          <a:p>
+            <a:pPr marL="457200" indent="-457200" defTabSz="914400">
+              <a:lnSpc>
+                <a:spcPct val="90000"/>
+              </a:lnSpc>
+              <a:spcBef>
+                <a:spcPts val="1200"/>
+              </a:spcBef>
+              <a:buClr>
+                <a:schemeClr val="accent1"/>
+              </a:buClr>
+              <a:buFont typeface="Arial" panose="020B0604020202020204" pitchFamily="34" charset="0"/>
+              <a:buChar char="•"/>
+            </a:pPr>
             <a:endParaRPr lang="en-US" sz="2800" dirty="0" smtClean="0">
               <a:solidFill>
                 <a:schemeClr val="tx1">
@@ -5444,208 +5484,6 @@
           </a:p>
         </p:txBody>
       </p:sp>
-      <p:graphicFrame>
-        <p:nvGraphicFramePr>
-          <p:cNvPr id="4" name="Table 3"/>
-          <p:cNvGraphicFramePr>
-            <a:graphicFrameLocks noGrp="1"/>
-          </p:cNvGraphicFramePr>
-          <p:nvPr>
-            <p:extLst>
-              <p:ext uri="{D42A27DB-BD31-4B8C-83A1-F6EECF244321}">
-                <p14:modId xmlns:p14="http://schemas.microsoft.com/office/powerpoint/2010/main" val="1436969537"/>
-              </p:ext>
-            </p:extLst>
-          </p:nvPr>
-        </p:nvGraphicFramePr>
-        <p:xfrm>
-          <a:off x="3794973" y="1865885"/>
-          <a:ext cx="7512677" cy="2392680"/>
-        </p:xfrm>
-        <a:graphic>
-          <a:graphicData uri="http://schemas.openxmlformats.org/drawingml/2006/table">
-            <a:tbl>
-              <a:tblPr firstRow="1" bandRow="1">
-                <a:tableStyleId>{69012ECD-51FC-41F1-AA8D-1B2483CD663E}</a:tableStyleId>
-              </a:tblPr>
-              <a:tblGrid>
-                <a:gridCol w="2309576"/>
-                <a:gridCol w="5203101"/>
-              </a:tblGrid>
-              <a:tr h="370840">
-                <a:tc>
-                  <a:txBody>
-                    <a:bodyPr/>
-                    <a:lstStyle/>
-                    <a:p>
-                      <a:r>
-                        <a:rPr lang="en-US" dirty="0" smtClean="0"/>
-                        <a:t>Member</a:t>
-                      </a:r>
-                      <a:endParaRPr lang="en-US" dirty="0"/>
-                    </a:p>
-                  </a:txBody>
-                  <a:tcPr/>
-                </a:tc>
-                <a:tc>
-                  <a:txBody>
-                    <a:bodyPr/>
-                    <a:lstStyle/>
-                    <a:p>
-                      <a:r>
-                        <a:rPr lang="en-US" dirty="0" smtClean="0"/>
-                        <a:t>Meaning</a:t>
-                      </a:r>
-                      <a:endParaRPr lang="en-US" dirty="0"/>
-                    </a:p>
-                  </a:txBody>
-                  <a:tcPr/>
-                </a:tc>
-              </a:tr>
-              <a:tr h="370840">
-                <a:tc>
-                  <a:txBody>
-                    <a:bodyPr/>
-                    <a:lstStyle/>
-                    <a:p>
-                      <a:r>
-                        <a:rPr lang="en-US" dirty="0" err="1" smtClean="0"/>
-                        <a:t>InnerException</a:t>
-                      </a:r>
-                      <a:endParaRPr lang="en-US" dirty="0"/>
-                    </a:p>
-                  </a:txBody>
-                  <a:tcPr/>
-                </a:tc>
-                <a:tc>
-                  <a:txBody>
-                    <a:bodyPr/>
-                    <a:lstStyle/>
-                    <a:p>
-                      <a:r>
-                        <a:rPr lang="en-US" dirty="0" smtClean="0"/>
-                        <a:t>Information</a:t>
-                      </a:r>
-                      <a:r>
-                        <a:rPr lang="en-US" baseline="0" dirty="0" smtClean="0"/>
-                        <a:t> about the exception</a:t>
-                      </a:r>
-                      <a:endParaRPr lang="en-US" dirty="0"/>
-                    </a:p>
-                  </a:txBody>
-                  <a:tcPr/>
-                </a:tc>
-              </a:tr>
-              <a:tr h="370840">
-                <a:tc>
-                  <a:txBody>
-                    <a:bodyPr/>
-                    <a:lstStyle/>
-                    <a:p>
-                      <a:r>
-                        <a:rPr lang="en-US" dirty="0" smtClean="0"/>
-                        <a:t>Message</a:t>
-                      </a:r>
-                      <a:endParaRPr lang="en-US" dirty="0"/>
-                    </a:p>
-                  </a:txBody>
-                  <a:tcPr/>
-                </a:tc>
-                <a:tc>
-                  <a:txBody>
-                    <a:bodyPr/>
-                    <a:lstStyle/>
-                    <a:p>
-                      <a:r>
-                        <a:rPr lang="en-US" dirty="0" smtClean="0"/>
-                        <a:t>Detail</a:t>
-                      </a:r>
-                      <a:r>
-                        <a:rPr lang="en-US" baseline="0" dirty="0" smtClean="0"/>
-                        <a:t> d</a:t>
-                      </a:r>
-                      <a:r>
-                        <a:rPr lang="en-US" dirty="0" smtClean="0"/>
-                        <a:t>escription about the error</a:t>
-                      </a:r>
-                      <a:endParaRPr lang="en-US" dirty="0"/>
-                    </a:p>
-                  </a:txBody>
-                  <a:tcPr/>
-                </a:tc>
-              </a:tr>
-              <a:tr h="370840">
-                <a:tc>
-                  <a:txBody>
-                    <a:bodyPr/>
-                    <a:lstStyle/>
-                    <a:p>
-                      <a:r>
-                        <a:rPr lang="en-US" dirty="0" smtClean="0"/>
-                        <a:t>Source</a:t>
-                      </a:r>
-                      <a:endParaRPr lang="en-US" dirty="0"/>
-                    </a:p>
-                  </a:txBody>
-                  <a:tcPr/>
-                </a:tc>
-                <a:tc>
-                  <a:txBody>
-                    <a:bodyPr/>
-                    <a:lstStyle/>
-                    <a:p>
-                      <a:r>
-                        <a:rPr lang="en-US" dirty="0" smtClean="0"/>
-                        <a:t>Name of Assembly</a:t>
-                      </a:r>
-                      <a:r>
-                        <a:rPr lang="en-US" baseline="0" dirty="0" smtClean="0"/>
-                        <a:t> or object which raised the exception</a:t>
-                      </a:r>
-                      <a:endParaRPr lang="en-US" dirty="0"/>
-                    </a:p>
-                  </a:txBody>
-                  <a:tcPr/>
-                </a:tc>
-              </a:tr>
-              <a:tr h="322450">
-                <a:tc>
-                  <a:txBody>
-                    <a:bodyPr/>
-                    <a:lstStyle/>
-                    <a:p>
-                      <a:r>
-                        <a:rPr lang="en-US" dirty="0" err="1" smtClean="0"/>
-                        <a:t>StackTrack</a:t>
-                      </a:r>
-                      <a:endParaRPr lang="en-US" dirty="0"/>
-                    </a:p>
-                  </a:txBody>
-                  <a:tcPr/>
-                </a:tc>
-                <a:tc>
-                  <a:txBody>
-                    <a:bodyPr/>
-                    <a:lstStyle/>
-                    <a:p>
-                      <a:r>
-                        <a:rPr lang="en-US" dirty="0" smtClean="0"/>
-                        <a:t>Sequence of calls</a:t>
-                      </a:r>
-                      <a:r>
-                        <a:rPr lang="en-US" baseline="0" dirty="0" smtClean="0"/>
-                        <a:t> that raised the exception. Very use full while debugging.</a:t>
-                      </a:r>
-                      <a:endParaRPr lang="en-US" dirty="0"/>
-                    </a:p>
-                  </a:txBody>
-                  <a:tcPr/>
-                </a:tc>
-              </a:tr>
-            </a:tbl>
-          </a:graphicData>
-        </a:graphic>
-      </p:graphicFrame>
     </p:spTree>
     <p:extLst>
       <p:ext uri="{BB962C8B-B14F-4D97-AF65-F5344CB8AC3E}">

</xml_diff>